<commit_message>
Update PsychoBot - 1st Sprint.pptx
</commit_message>
<xml_diff>
--- a/Presentations/PsychoBot - 1st Sprint.pptx
+++ b/Presentations/PsychoBot - 1st Sprint.pptx
@@ -115,6 +115,11 @@
       </a:defRPr>
     </a:lvl9pPr>
   </p:defaultTextStyle>
+  <p:extLst>
+    <p:ext uri="{EFAFB233-063F-42B5-8137-9DF3F51BA10A}">
+      <p15:sldGuideLst xmlns:p15="http://schemas.microsoft.com/office/powerpoint/2012/main"/>
+    </p:ext>
+  </p:extLst>
 </p:presentation>
 </file>
 
@@ -3496,26 +3501,52 @@
         </p:nvSpPr>
         <p:spPr/>
         <p:txBody>
-          <a:bodyPr/>
+          <a:bodyPr>
+            <a:normAutofit/>
+          </a:bodyPr>
           <a:lstStyle/>
           <a:p>
             <a:pPr algn="l" rtl="0"/>
             <a:r>
-              <a:rPr lang="en-US" dirty="0" smtClean="0">
+              <a:rPr lang="en-US" sz="2400" dirty="0" smtClean="0">
                 <a:latin typeface="Poppins Regular" panose="00000500000000000000" pitchFamily="2" charset="0"/>
               </a:rPr>
-              <a:t>Neural Network – with LSTM Architecture (Long short term memory)</a:t>
-            </a:r>
-          </a:p>
-          <a:p>
-            <a:pPr algn="l" rtl="0"/>
-            <a:r>
-              <a:rPr lang="en-US" dirty="0" smtClean="0">
+              <a:t>Neural Network – with LSTM Architecture (Long </a:t>
+            </a:r>
+            <a:r>
+              <a:rPr lang="en-US" sz="2400" dirty="0" smtClean="0">
                 <a:latin typeface="Poppins Regular" panose="00000500000000000000" pitchFamily="2" charset="0"/>
               </a:rPr>
-              <a:t>Dataset loading and parsing (Word embedding, Lemmatization)</a:t>
-            </a:r>
-            <a:endParaRPr lang="he-IL" dirty="0">
+              <a:t>short-term </a:t>
+            </a:r>
+            <a:r>
+              <a:rPr lang="en-US" sz="2400" dirty="0" smtClean="0">
+                <a:latin typeface="Poppins Regular" panose="00000500000000000000" pitchFamily="2" charset="0"/>
+              </a:rPr>
+              <a:t>memory)</a:t>
+            </a:r>
+          </a:p>
+          <a:p>
+            <a:pPr algn="l" rtl="0"/>
+            <a:r>
+              <a:rPr lang="en-US" sz="2400" dirty="0" smtClean="0">
+                <a:latin typeface="Poppins Regular" panose="00000500000000000000" pitchFamily="2" charset="0"/>
+              </a:rPr>
+              <a:t>Dataset loading and parsing (Word embedding, </a:t>
+            </a:r>
+            <a:r>
+              <a:rPr lang="en-US" sz="2400" dirty="0" smtClean="0">
+                <a:latin typeface="Poppins Regular" panose="00000500000000000000" pitchFamily="2" charset="0"/>
+              </a:rPr>
+              <a:t>Sterilization, and Lemmatization</a:t>
+            </a:r>
+            <a:r>
+              <a:rPr lang="en-US" sz="2400" dirty="0" smtClean="0">
+                <a:latin typeface="Poppins Regular" panose="00000500000000000000" pitchFamily="2" charset="0"/>
+              </a:rPr>
+              <a:t>)</a:t>
+            </a:r>
+            <a:endParaRPr lang="he-IL" sz="2400" dirty="0">
               <a:latin typeface="Poppins Regular" panose="00000500000000000000" pitchFamily="2" charset="0"/>
             </a:endParaRPr>
           </a:p>
@@ -3759,8 +3790,8 @@
         </p:blipFill>
         <p:spPr>
           <a:xfrm>
-            <a:off x="1236354" y="1212782"/>
-            <a:ext cx="9719291" cy="4351338"/>
+            <a:off x="1572784" y="1554743"/>
+            <a:ext cx="8916937" cy="3992123"/>
           </a:xfrm>
         </p:spPr>
       </p:pic>
@@ -4076,7 +4107,31 @@
                 <a:latin typeface="Poppins Regular" panose="00000500000000000000" pitchFamily="2" charset="0"/>
                 <a:cs typeface="Poppins Regular" panose="00000500000000000000" pitchFamily="2" charset="0"/>
               </a:rPr>
-              <a:t>API and Website</a:t>
+              <a:t>API and </a:t>
+            </a:r>
+            <a:r>
+              <a:rPr lang="en-US" sz="2400" dirty="0" smtClean="0">
+                <a:latin typeface="Poppins Regular" panose="00000500000000000000" pitchFamily="2" charset="0"/>
+                <a:cs typeface="Poppins Regular" panose="00000500000000000000" pitchFamily="2" charset="0"/>
+              </a:rPr>
+              <a:t>Website</a:t>
+            </a:r>
+          </a:p>
+          <a:p>
+            <a:pPr algn="l" rtl="0"/>
+            <a:r>
+              <a:rPr lang="en-US" sz="2400" dirty="0" smtClean="0">
+                <a:latin typeface="Poppins Regular" panose="00000500000000000000" pitchFamily="2" charset="0"/>
+                <a:cs typeface="Poppins Regular" panose="00000500000000000000" pitchFamily="2" charset="0"/>
+              </a:rPr>
+              <a:t>Improvement of the LSTM </a:t>
+            </a:r>
+            <a:r>
+              <a:rPr lang="en-US" sz="2400" dirty="0" err="1" smtClean="0">
+                <a:latin typeface="Poppins Regular" panose="00000500000000000000" pitchFamily="2" charset="0"/>
+                <a:cs typeface="Poppins Regular" panose="00000500000000000000" pitchFamily="2" charset="0"/>
+              </a:rPr>
+              <a:t>Architedture</a:t>
             </a:r>
             <a:endParaRPr lang="en-US" sz="2400" dirty="0">
               <a:latin typeface="Poppins Regular" panose="00000500000000000000" pitchFamily="2" charset="0"/>

</xml_diff>